<commit_message>
Rename documentos de Revisión de Conceptos
</commit_message>
<xml_diff>
--- a/Diapositivas/1. Unit Testing.pptx
+++ b/Diapositivas/1. Unit Testing.pptx
@@ -248,7 +248,7 @@
           <a:p>
             <a:fld id="{63D5FC4C-9EE1-4746-A368-724F618FC790}" type="datetimeFigureOut">
               <a:rPr lang="es-PE" smtClean="0"/>
-              <a:t>22/04/2013</a:t>
+              <a:t>24/04/2013</a:t>
             </a:fld>
             <a:endParaRPr lang="es-PE"/>
           </a:p>
@@ -8242,7 +8242,7 @@
             <a:fld id="{807CB568-C05F-482F-9F26-AA302B8892DF}" type="datetimeFigureOut">
               <a:rPr lang="es-ES" smtClean="0"/>
               <a:pPr/>
-              <a:t>22/04/2013</a:t>
+              <a:t>24/04/2013</a:t>
             </a:fld>
             <a:endParaRPr lang="es-ES"/>
           </a:p>
@@ -8421,7 +8421,7 @@
             <a:fld id="{807CB568-C05F-482F-9F26-AA302B8892DF}" type="datetimeFigureOut">
               <a:rPr lang="es-ES" smtClean="0"/>
               <a:pPr/>
-              <a:t>22/04/2013</a:t>
+              <a:t>24/04/2013</a:t>
             </a:fld>
             <a:endParaRPr lang="es-ES"/>
           </a:p>
@@ -8610,7 +8610,7 @@
             <a:fld id="{807CB568-C05F-482F-9F26-AA302B8892DF}" type="datetimeFigureOut">
               <a:rPr lang="es-ES" smtClean="0"/>
               <a:pPr/>
-              <a:t>22/04/2013</a:t>
+              <a:t>24/04/2013</a:t>
             </a:fld>
             <a:endParaRPr lang="es-ES"/>
           </a:p>
@@ -8789,7 +8789,7 @@
             <a:fld id="{807CB568-C05F-482F-9F26-AA302B8892DF}" type="datetimeFigureOut">
               <a:rPr lang="es-ES" smtClean="0"/>
               <a:pPr/>
-              <a:t>22/04/2013</a:t>
+              <a:t>24/04/2013</a:t>
             </a:fld>
             <a:endParaRPr lang="es-ES"/>
           </a:p>
@@ -9044,7 +9044,7 @@
             <a:fld id="{807CB568-C05F-482F-9F26-AA302B8892DF}" type="datetimeFigureOut">
               <a:rPr lang="es-ES" smtClean="0"/>
               <a:pPr/>
-              <a:t>22/04/2013</a:t>
+              <a:t>24/04/2013</a:t>
             </a:fld>
             <a:endParaRPr lang="es-ES"/>
           </a:p>
@@ -9341,7 +9341,7 @@
             <a:fld id="{807CB568-C05F-482F-9F26-AA302B8892DF}" type="datetimeFigureOut">
               <a:rPr lang="es-ES" smtClean="0"/>
               <a:pPr/>
-              <a:t>22/04/2013</a:t>
+              <a:t>24/04/2013</a:t>
             </a:fld>
             <a:endParaRPr lang="es-ES"/>
           </a:p>
@@ -9772,7 +9772,7 @@
             <a:fld id="{807CB568-C05F-482F-9F26-AA302B8892DF}" type="datetimeFigureOut">
               <a:rPr lang="es-ES" smtClean="0"/>
               <a:pPr/>
-              <a:t>22/04/2013</a:t>
+              <a:t>24/04/2013</a:t>
             </a:fld>
             <a:endParaRPr lang="es-ES"/>
           </a:p>
@@ -9899,7 +9899,7 @@
             <a:fld id="{807CB568-C05F-482F-9F26-AA302B8892DF}" type="datetimeFigureOut">
               <a:rPr lang="es-ES" smtClean="0"/>
               <a:pPr/>
-              <a:t>22/04/2013</a:t>
+              <a:t>24/04/2013</a:t>
             </a:fld>
             <a:endParaRPr lang="es-ES"/>
           </a:p>
@@ -10003,7 +10003,7 @@
             <a:fld id="{807CB568-C05F-482F-9F26-AA302B8892DF}" type="datetimeFigureOut">
               <a:rPr lang="es-ES" smtClean="0"/>
               <a:pPr/>
-              <a:t>22/04/2013</a:t>
+              <a:t>24/04/2013</a:t>
             </a:fld>
             <a:endParaRPr lang="es-ES"/>
           </a:p>
@@ -10289,7 +10289,7 @@
             <a:fld id="{807CB568-C05F-482F-9F26-AA302B8892DF}" type="datetimeFigureOut">
               <a:rPr lang="es-ES" smtClean="0"/>
               <a:pPr/>
-              <a:t>22/04/2013</a:t>
+              <a:t>24/04/2013</a:t>
             </a:fld>
             <a:endParaRPr lang="es-ES"/>
           </a:p>
@@ -10558,7 +10558,7 @@
             <a:fld id="{807CB568-C05F-482F-9F26-AA302B8892DF}" type="datetimeFigureOut">
               <a:rPr lang="es-ES" smtClean="0"/>
               <a:pPr/>
-              <a:t>22/04/2013</a:t>
+              <a:t>24/04/2013</a:t>
             </a:fld>
             <a:endParaRPr lang="es-ES"/>
           </a:p>
@@ -10809,7 +10809,7 @@
             <a:fld id="{807CB568-C05F-482F-9F26-AA302B8892DF}" type="datetimeFigureOut">
               <a:rPr lang="es-ES" smtClean="0"/>
               <a:pPr/>
-              <a:t>22/04/2013</a:t>
+              <a:t>24/04/2013</a:t>
             </a:fld>
             <a:endParaRPr lang="es-ES"/>
           </a:p>
@@ -27667,11 +27667,6 @@
               </a:rPr>
               <a:t>://weblogs.java.net/blog/johnsmart/archive/2009/11/28/data-driven-tests-junit-4-and-excel</a:t>
             </a:r>
-            <a:endParaRPr lang="es-PE" sz="2400" dirty="0">
-              <a:solidFill>
-                <a:srgbClr val="FFC000"/>
-              </a:solidFill>
-            </a:endParaRPr>
           </a:p>
         </p:txBody>
       </p:sp>

</xml_diff>